<commit_message>
update documents for IRB
</commit_message>
<xml_diff>
--- a/irb/Documents/Instructions - ScreenShots.pptx
+++ b/irb/Documents/Instructions - ScreenShots.pptx
@@ -1600,7 +1600,7 @@
           <a:p>
             <a:fld id="{D83F828B-538D-44FA-9A96-F3C6D6FF69F4}" type="datetimeFigureOut">
               <a:rPr lang="en-US" smtClean="0"/>
-              <a:t>2/1/2022</a:t>
+              <a:t>2/3/2022</a:t>
             </a:fld>
             <a:endParaRPr lang="en-US"/>
           </a:p>
@@ -2542,7 +2542,7 @@
           <a:p>
             <a:fld id="{31EE8B0B-402A-46C1-B9C5-D98F384C91E7}" type="datetimeFigureOut">
               <a:rPr lang="en-US" smtClean="0"/>
-              <a:t>2/1/2022</a:t>
+              <a:t>2/3/2022</a:t>
             </a:fld>
             <a:endParaRPr lang="en-US"/>
           </a:p>
@@ -2740,7 +2740,7 @@
           <a:p>
             <a:fld id="{31EE8B0B-402A-46C1-B9C5-D98F384C91E7}" type="datetimeFigureOut">
               <a:rPr lang="en-US" smtClean="0"/>
-              <a:t>2/1/2022</a:t>
+              <a:t>2/3/2022</a:t>
             </a:fld>
             <a:endParaRPr lang="en-US"/>
           </a:p>
@@ -2948,7 +2948,7 @@
           <a:p>
             <a:fld id="{31EE8B0B-402A-46C1-B9C5-D98F384C91E7}" type="datetimeFigureOut">
               <a:rPr lang="en-US" smtClean="0"/>
-              <a:t>2/1/2022</a:t>
+              <a:t>2/3/2022</a:t>
             </a:fld>
             <a:endParaRPr lang="en-US"/>
           </a:p>
@@ -3146,7 +3146,7 @@
           <a:p>
             <a:fld id="{31EE8B0B-402A-46C1-B9C5-D98F384C91E7}" type="datetimeFigureOut">
               <a:rPr lang="en-US" smtClean="0"/>
-              <a:t>2/1/2022</a:t>
+              <a:t>2/3/2022</a:t>
             </a:fld>
             <a:endParaRPr lang="en-US"/>
           </a:p>
@@ -3421,7 +3421,7 @@
           <a:p>
             <a:fld id="{31EE8B0B-402A-46C1-B9C5-D98F384C91E7}" type="datetimeFigureOut">
               <a:rPr lang="en-US" smtClean="0"/>
-              <a:t>2/1/2022</a:t>
+              <a:t>2/3/2022</a:t>
             </a:fld>
             <a:endParaRPr lang="en-US"/>
           </a:p>
@@ -3686,7 +3686,7 @@
           <a:p>
             <a:fld id="{31EE8B0B-402A-46C1-B9C5-D98F384C91E7}" type="datetimeFigureOut">
               <a:rPr lang="en-US" smtClean="0"/>
-              <a:t>2/1/2022</a:t>
+              <a:t>2/3/2022</a:t>
             </a:fld>
             <a:endParaRPr lang="en-US"/>
           </a:p>
@@ -4098,7 +4098,7 @@
           <a:p>
             <a:fld id="{31EE8B0B-402A-46C1-B9C5-D98F384C91E7}" type="datetimeFigureOut">
               <a:rPr lang="en-US" smtClean="0"/>
-              <a:t>2/1/2022</a:t>
+              <a:t>2/3/2022</a:t>
             </a:fld>
             <a:endParaRPr lang="en-US"/>
           </a:p>
@@ -4239,7 +4239,7 @@
           <a:p>
             <a:fld id="{31EE8B0B-402A-46C1-B9C5-D98F384C91E7}" type="datetimeFigureOut">
               <a:rPr lang="en-US" smtClean="0"/>
-              <a:t>2/1/2022</a:t>
+              <a:t>2/3/2022</a:t>
             </a:fld>
             <a:endParaRPr lang="en-US"/>
           </a:p>
@@ -4352,7 +4352,7 @@
           <a:p>
             <a:fld id="{31EE8B0B-402A-46C1-B9C5-D98F384C91E7}" type="datetimeFigureOut">
               <a:rPr lang="en-US" smtClean="0"/>
-              <a:t>2/1/2022</a:t>
+              <a:t>2/3/2022</a:t>
             </a:fld>
             <a:endParaRPr lang="en-US"/>
           </a:p>
@@ -4663,7 +4663,7 @@
           <a:p>
             <a:fld id="{31EE8B0B-402A-46C1-B9C5-D98F384C91E7}" type="datetimeFigureOut">
               <a:rPr lang="en-US" smtClean="0"/>
-              <a:t>2/1/2022</a:t>
+              <a:t>2/3/2022</a:t>
             </a:fld>
             <a:endParaRPr lang="en-US"/>
           </a:p>
@@ -4951,7 +4951,7 @@
           <a:p>
             <a:fld id="{31EE8B0B-402A-46C1-B9C5-D98F384C91E7}" type="datetimeFigureOut">
               <a:rPr lang="en-US" smtClean="0"/>
-              <a:t>2/1/2022</a:t>
+              <a:t>2/3/2022</a:t>
             </a:fld>
             <a:endParaRPr lang="en-US"/>
           </a:p>
@@ -5192,7 +5192,7 @@
           <a:p>
             <a:fld id="{31EE8B0B-402A-46C1-B9C5-D98F384C91E7}" type="datetimeFigureOut">
               <a:rPr lang="en-US" smtClean="0"/>
-              <a:t>2/1/2022</a:t>
+              <a:t>2/3/2022</a:t>
             </a:fld>
             <a:endParaRPr lang="en-US"/>
           </a:p>
@@ -6097,7 +6097,7 @@
               <a:rPr lang="en-US" sz="6600" dirty="0">
                 <a:cs typeface="Calibri"/>
               </a:rPr>
-              <a:t>Informed consent form </a:t>
+              <a:t>Informed consent page</a:t>
             </a:r>
           </a:p>
           <a:p>
@@ -6168,7 +6168,7 @@
               <a:rPr lang="en-US" sz="6900" dirty="0">
                 <a:cs typeface="Calibri"/>
               </a:rPr>
-              <a:t>We will introduce the contents in background information, questions for maps, and completion code in the slides.</a:t>
+              <a:t>We will introduce the contents in background information, questions for maps, and completion code in this instruction.</a:t>
             </a:r>
           </a:p>
         </p:txBody>
@@ -6278,79 +6278,105 @@
           </a:bodyPr>
           <a:lstStyle/>
           <a:p>
-            <a:pPr marL="228600" indent="-228600">
-              <a:buFont typeface="Arial" panose="020B0604020202020204" pitchFamily="34" charset="0"/>
-              <a:buChar char="•"/>
-            </a:pPr>
             <a:r>
               <a:rPr lang="en-US" sz="2800" dirty="0">
                 <a:cs typeface="Calibri"/>
               </a:rPr>
-              <a:t>The participants will be asked about their background in geography and cartography, which will be used for experiment control purposes.</a:t>
-            </a:r>
-          </a:p>
-          <a:p>
-            <a:pPr marL="228600" indent="-228600">
-              <a:buFont typeface="Arial" panose="020B0604020202020204" pitchFamily="34" charset="0"/>
-              <a:buChar char="•"/>
-            </a:pPr>
-            <a:r>
-              <a:rPr lang="en-US" sz="2800" dirty="0">
-                <a:cs typeface="Calibri"/>
-              </a:rPr>
-              <a:t>There are three questions in this section:</a:t>
-            </a:r>
-          </a:p>
-          <a:p>
-            <a:pPr marL="685800" lvl="1" indent="-228600">
-              <a:buFont typeface="Arial" panose="020B0604020202020204" pitchFamily="34" charset="0"/>
-              <a:buChar char="•"/>
-            </a:pPr>
-            <a:r>
-              <a:rPr lang="en-US" sz="2600" dirty="0">
-                <a:cs typeface="Calibri"/>
-              </a:rPr>
-              <a:t>Have you taken a class in Department of Geography?</a:t>
-            </a:r>
-          </a:p>
-          <a:p>
-            <a:pPr marL="685800" lvl="1" indent="-228600">
-              <a:buFont typeface="Arial" panose="020B0604020202020204" pitchFamily="34" charset="0"/>
-              <a:buChar char="•"/>
-            </a:pPr>
-            <a:r>
-              <a:rPr lang="en-US" sz="2600" dirty="0">
-                <a:cs typeface="Calibri"/>
-              </a:rPr>
-              <a:t>Have you taken a cartography related class?</a:t>
-            </a:r>
-          </a:p>
-          <a:p>
-            <a:pPr marL="685800" lvl="1" indent="-228600">
-              <a:buFont typeface="Arial" panose="020B0604020202020204" pitchFamily="34" charset="0"/>
-              <a:buChar char="•"/>
-            </a:pPr>
-            <a:r>
-              <a:rPr lang="en-US" sz="2600" dirty="0">
-                <a:cs typeface="Calibri"/>
-              </a:rPr>
-              <a:t>Is this survey your class assignment from either </a:t>
-            </a:r>
-            <a:r>
-              <a:rPr lang="en-US" sz="2600" dirty="0" err="1">
-                <a:cs typeface="Calibri"/>
-              </a:rPr>
-              <a:t>GeoVisualization</a:t>
-            </a:r>
-            <a:r>
-              <a:rPr lang="en-US" sz="2600" dirty="0">
-                <a:cs typeface="Calibri"/>
-              </a:rPr>
-              <a:t> (GEOG 5201) or Design and Implementation of GIS (GEOG 5223)? </a:t>
-            </a:r>
-          </a:p>
-        </p:txBody>
-      </p:sp>
+              <a:t>The participants will be asked three questions about their educational background in geography and cartography and about whether the survey is a class assignment.</a:t>
+            </a:r>
+          </a:p>
+        </p:txBody>
+      </p:sp>
+      <p:pic>
+        <p:nvPicPr>
+          <p:cNvPr id="11" name="Picture 10">
+            <a:extLst>
+              <a:ext uri="{FF2B5EF4-FFF2-40B4-BE49-F238E27FC236}">
+                <a16:creationId xmlns:a16="http://schemas.microsoft.com/office/drawing/2014/main" id="{98D7FDD4-9041-4559-8360-028178790D17}"/>
+              </a:ext>
+            </a:extLst>
+          </p:cNvPr>
+          <p:cNvPicPr>
+            <a:picLocks noChangeAspect="1"/>
+          </p:cNvPicPr>
+          <p:nvPr/>
+        </p:nvPicPr>
+        <p:blipFill>
+          <a:blip r:embed="rId2"/>
+          <a:stretch>
+            <a:fillRect/>
+          </a:stretch>
+        </p:blipFill>
+        <p:spPr>
+          <a:xfrm>
+            <a:off x="6427779" y="2728789"/>
+            <a:ext cx="3418414" cy="2043926"/>
+          </a:xfrm>
+          <a:prstGeom prst="rect">
+            <a:avLst/>
+          </a:prstGeom>
+        </p:spPr>
+      </p:pic>
+      <p:pic>
+        <p:nvPicPr>
+          <p:cNvPr id="13" name="Picture 12">
+            <a:extLst>
+              <a:ext uri="{FF2B5EF4-FFF2-40B4-BE49-F238E27FC236}">
+                <a16:creationId xmlns:a16="http://schemas.microsoft.com/office/drawing/2014/main" id="{8513DAC5-4349-46AD-BC5B-25715EE52ACF}"/>
+              </a:ext>
+            </a:extLst>
+          </p:cNvPr>
+          <p:cNvPicPr>
+            <a:picLocks noChangeAspect="1"/>
+          </p:cNvPicPr>
+          <p:nvPr/>
+        </p:nvPicPr>
+        <p:blipFill>
+          <a:blip r:embed="rId3"/>
+          <a:stretch>
+            <a:fillRect/>
+          </a:stretch>
+        </p:blipFill>
+        <p:spPr>
+          <a:xfrm>
+            <a:off x="2797213" y="4869692"/>
+            <a:ext cx="6597570" cy="1988308"/>
+          </a:xfrm>
+          <a:prstGeom prst="rect">
+            <a:avLst/>
+          </a:prstGeom>
+        </p:spPr>
+      </p:pic>
+      <p:pic>
+        <p:nvPicPr>
+          <p:cNvPr id="16" name="Picture 15">
+            <a:extLst>
+              <a:ext uri="{FF2B5EF4-FFF2-40B4-BE49-F238E27FC236}">
+                <a16:creationId xmlns:a16="http://schemas.microsoft.com/office/drawing/2014/main" id="{6F7D3AB8-BB24-4D36-A59A-CF5278A47AF9}"/>
+              </a:ext>
+            </a:extLst>
+          </p:cNvPr>
+          <p:cNvPicPr>
+            <a:picLocks noChangeAspect="1"/>
+          </p:cNvPicPr>
+          <p:nvPr/>
+        </p:nvPicPr>
+        <p:blipFill>
+          <a:blip r:embed="rId4"/>
+          <a:stretch>
+            <a:fillRect/>
+          </a:stretch>
+        </p:blipFill>
+        <p:spPr>
+          <a:xfrm>
+            <a:off x="2379615" y="2728789"/>
+            <a:ext cx="4048164" cy="2043926"/>
+          </a:xfrm>
+          <a:prstGeom prst="rect">
+            <a:avLst/>
+          </a:prstGeom>
+        </p:spPr>
+      </p:pic>
     </p:spTree>
     <p:extLst>
       <p:ext uri="{BB962C8B-B14F-4D97-AF65-F5344CB8AC3E}">
@@ -8164,18 +8190,18 @@
 </file>
 
 <file path=customXml/item1.xml><?xml version="1.0" encoding="utf-8"?>
+<p:properties xmlns:p="http://schemas.microsoft.com/office/2006/metadata/properties" xmlns:xsi="http://www.w3.org/2001/XMLSchema-instance" xmlns:pc="http://schemas.microsoft.com/office/infopath/2007/PartnerControls">
+  <documentManagement/>
+</p:properties>
+</file>
+
+<file path=customXml/item2.xml><?xml version="1.0" encoding="utf-8"?>
 <?mso-contentType ?>
 <FormTemplates xmlns="http://schemas.microsoft.com/sharepoint/v3/contenttype/forms">
   <Display>DocumentLibraryForm</Display>
   <Edit>DocumentLibraryForm</Edit>
   <New>DocumentLibraryForm</New>
 </FormTemplates>
-</file>
-
-<file path=customXml/item2.xml><?xml version="1.0" encoding="utf-8"?>
-<p:properties xmlns:p="http://schemas.microsoft.com/office/2006/metadata/properties" xmlns:xsi="http://www.w3.org/2001/XMLSchema-instance" xmlns:pc="http://schemas.microsoft.com/office/infopath/2007/PartnerControls">
-  <documentManagement/>
-</p:properties>
 </file>
 
 <file path=customXml/item3.xml><?xml version="1.0" encoding="utf-8"?>
@@ -8390,26 +8416,26 @@
 </file>
 
 <file path=customXml/itemProps1.xml><?xml version="1.0" encoding="utf-8"?>
-<ds:datastoreItem xmlns:ds="http://schemas.openxmlformats.org/officeDocument/2006/customXml" ds:itemID="{5D3312CF-FCB4-4310-96F4-EA43C6DB194C}">
+<ds:datastoreItem xmlns:ds="http://schemas.openxmlformats.org/officeDocument/2006/customXml" ds:itemID="{E0B1BEB6-0D99-4A6A-9770-EA4159C25FEB}">
   <ds:schemaRefs>
-    <ds:schemaRef ds:uri="http://schemas.microsoft.com/sharepoint/v3/contenttype/forms"/>
+    <ds:schemaRef ds:uri="http://purl.org/dc/dcmitype/"/>
+    <ds:schemaRef ds:uri="345ab639-1b23-467f-8c10-9ab9f1e3252c"/>
+    <ds:schemaRef ds:uri="http://schemas.microsoft.com/office/2006/metadata/properties"/>
+    <ds:schemaRef ds:uri="http://purl.org/dc/elements/1.1/"/>
+    <ds:schemaRef ds:uri="http://schemas.microsoft.com/office/2006/documentManagement/types"/>
+    <ds:schemaRef ds:uri="http://schemas.microsoft.com/office/infopath/2007/PartnerControls"/>
+    <ds:schemaRef ds:uri="http://schemas.openxmlformats.org/package/2006/metadata/core-properties"/>
+    <ds:schemaRef ds:uri="02f1c872-1a05-4968-a32e-1afc686dc907"/>
+    <ds:schemaRef ds:uri="http://www.w3.org/XML/1998/namespace"/>
+    <ds:schemaRef ds:uri="http://purl.org/dc/terms/"/>
   </ds:schemaRefs>
 </ds:datastoreItem>
 </file>
 
 <file path=customXml/itemProps2.xml><?xml version="1.0" encoding="utf-8"?>
-<ds:datastoreItem xmlns:ds="http://schemas.openxmlformats.org/officeDocument/2006/customXml" ds:itemID="{E0B1BEB6-0D99-4A6A-9770-EA4159C25FEB}">
+<ds:datastoreItem xmlns:ds="http://schemas.openxmlformats.org/officeDocument/2006/customXml" ds:itemID="{5D3312CF-FCB4-4310-96F4-EA43C6DB194C}">
   <ds:schemaRefs>
-    <ds:schemaRef ds:uri="02f1c872-1a05-4968-a32e-1afc686dc907"/>
-    <ds:schemaRef ds:uri="345ab639-1b23-467f-8c10-9ab9f1e3252c"/>
-    <ds:schemaRef ds:uri="http://purl.org/dc/dcmitype/"/>
-    <ds:schemaRef ds:uri="http://purl.org/dc/elements/1.1/"/>
-    <ds:schemaRef ds:uri="http://purl.org/dc/terms/"/>
-    <ds:schemaRef ds:uri="http://schemas.microsoft.com/office/2006/documentManagement/types"/>
-    <ds:schemaRef ds:uri="http://schemas.microsoft.com/office/2006/metadata/properties"/>
-    <ds:schemaRef ds:uri="http://schemas.microsoft.com/office/infopath/2007/PartnerControls"/>
-    <ds:schemaRef ds:uri="http://schemas.openxmlformats.org/package/2006/metadata/core-properties"/>
-    <ds:schemaRef ds:uri="http://www.w3.org/XML/1998/namespace"/>
+    <ds:schemaRef ds:uri="http://schemas.microsoft.com/sharepoint/v3/contenttype/forms"/>
   </ds:schemaRefs>
 </ds:datastoreItem>
 </file>

</xml_diff>